<commit_message>
Updated power point. Cleaned up Datastore code
</commit_message>
<xml_diff>
--- a/Android Development Tutorial.pptx
+++ b/Android Development Tutorial.pptx
@@ -1353,15 +1353,15 @@
     </dgm:pt>
   </dgm:ptLst>
   <dgm:cxnLst>
+    <dgm:cxn modelId="{E273863D-CA82-4B60-8D06-1C90E10B946E}" type="presOf" srcId="{47BE2BDA-57E8-43FF-BFEE-4BAE5A3FB69F}" destId="{3F8C558A-3025-4E30-993C-E4794EF17626}" srcOrd="0" destOrd="0" presId="urn:microsoft.com/office/officeart/2005/8/layout/default#1"/>
+    <dgm:cxn modelId="{957CC407-61D3-408D-AD1E-C586EB1821C2}" type="presOf" srcId="{CF5A5001-0018-4238-B4B1-EE552BFD88D6}" destId="{ADBB9E7D-5F04-4384-8B4E-FBBF086A7097}" srcOrd="0" destOrd="0" presId="urn:microsoft.com/office/officeart/2005/8/layout/default#1"/>
     <dgm:cxn modelId="{E7600388-7BF8-4FA1-BA43-485B292F89DF}" type="presOf" srcId="{5AB75BF9-9191-4F40-A3CA-02BCCF5785E1}" destId="{F8D81F5B-C592-418A-8DDB-866D4815E0C9}" srcOrd="0" destOrd="0" presId="urn:microsoft.com/office/officeart/2005/8/layout/default#1"/>
-    <dgm:cxn modelId="{957CC407-61D3-408D-AD1E-C586EB1821C2}" type="presOf" srcId="{CF5A5001-0018-4238-B4B1-EE552BFD88D6}" destId="{ADBB9E7D-5F04-4384-8B4E-FBBF086A7097}" srcOrd="0" destOrd="0" presId="urn:microsoft.com/office/officeart/2005/8/layout/default#1"/>
-    <dgm:cxn modelId="{E273863D-CA82-4B60-8D06-1C90E10B946E}" type="presOf" srcId="{47BE2BDA-57E8-43FF-BFEE-4BAE5A3FB69F}" destId="{3F8C558A-3025-4E30-993C-E4794EF17626}" srcOrd="0" destOrd="0" presId="urn:microsoft.com/office/officeart/2005/8/layout/default#1"/>
-    <dgm:cxn modelId="{6402FB99-F99C-484E-883D-61F1832D9F67}" srcId="{47BE2BDA-57E8-43FF-BFEE-4BAE5A3FB69F}" destId="{70BF27B8-70F8-4101-8E57-97AFFE55DAFA}" srcOrd="3" destOrd="0" parTransId="{524BC47A-66C3-47D2-8FB4-4B98B41ED622}" sibTransId="{B6AEAFAE-C9B5-4B40-A9A8-2FB1C03FEB31}"/>
+    <dgm:cxn modelId="{AEA71FA6-1B09-45C3-BF22-262E8026F6D5}" srcId="{47BE2BDA-57E8-43FF-BFEE-4BAE5A3FB69F}" destId="{5AB75BF9-9191-4F40-A3CA-02BCCF5785E1}" srcOrd="1" destOrd="0" parTransId="{4AC016FD-FC39-496D-95A0-77CCB925D91F}" sibTransId="{E488853C-4326-4570-823B-0FA60CB6012E}"/>
     <dgm:cxn modelId="{EC791555-FEFD-4A80-80C4-1239640826B6}" type="presOf" srcId="{70BF27B8-70F8-4101-8E57-97AFFE55DAFA}" destId="{EC2F2C16-7D9B-4F1D-9E2D-526221F0154A}" srcOrd="0" destOrd="0" presId="urn:microsoft.com/office/officeart/2005/8/layout/default#1"/>
-    <dgm:cxn modelId="{9D767576-06C5-49C5-8F83-9CE4BFA2419C}" srcId="{47BE2BDA-57E8-43FF-BFEE-4BAE5A3FB69F}" destId="{DC08D5BB-DC0C-4498-BAB1-33A1151A5E5C}" srcOrd="2" destOrd="0" parTransId="{1BC702F3-A3A4-4388-95B4-F9A7B5ADF0D1}" sibTransId="{BBE7E1E3-D2ED-4967-9862-4F32A7391B1C}"/>
-    <dgm:cxn modelId="{AEA71FA6-1B09-45C3-BF22-262E8026F6D5}" srcId="{47BE2BDA-57E8-43FF-BFEE-4BAE5A3FB69F}" destId="{5AB75BF9-9191-4F40-A3CA-02BCCF5785E1}" srcOrd="1" destOrd="0" parTransId="{4AC016FD-FC39-496D-95A0-77CCB925D91F}" sibTransId="{E488853C-4326-4570-823B-0FA60CB6012E}"/>
     <dgm:cxn modelId="{5E41D045-F802-420E-A802-20FBCFD1F12C}" srcId="{47BE2BDA-57E8-43FF-BFEE-4BAE5A3FB69F}" destId="{CF5A5001-0018-4238-B4B1-EE552BFD88D6}" srcOrd="0" destOrd="0" parTransId="{30B0BE6D-D4F0-4D9A-A3E5-981C608DC07C}" sibTransId="{2C94E246-0F7E-4C24-93BB-3562BA7BBA3D}"/>
     <dgm:cxn modelId="{C38A68AC-6F4B-440E-9509-F25E3BFC79E0}" type="presOf" srcId="{DC08D5BB-DC0C-4498-BAB1-33A1151A5E5C}" destId="{5C386227-B460-4831-AF83-42DC118D19E5}" srcOrd="0" destOrd="0" presId="urn:microsoft.com/office/officeart/2005/8/layout/default#1"/>
+    <dgm:cxn modelId="{6402FB99-F99C-484E-883D-61F1832D9F67}" srcId="{47BE2BDA-57E8-43FF-BFEE-4BAE5A3FB69F}" destId="{70BF27B8-70F8-4101-8E57-97AFFE55DAFA}" srcOrd="3" destOrd="0" parTransId="{524BC47A-66C3-47D2-8FB4-4B98B41ED622}" sibTransId="{B6AEAFAE-C9B5-4B40-A9A8-2FB1C03FEB31}"/>
+    <dgm:cxn modelId="{9D767576-06C5-49C5-8F83-9CE4BFA2419C}" srcId="{47BE2BDA-57E8-43FF-BFEE-4BAE5A3FB69F}" destId="{DC08D5BB-DC0C-4498-BAB1-33A1151A5E5C}" srcOrd="2" destOrd="0" parTransId="{1BC702F3-A3A4-4388-95B4-F9A7B5ADF0D1}" sibTransId="{BBE7E1E3-D2ED-4967-9862-4F32A7391B1C}"/>
     <dgm:cxn modelId="{1B59F6EB-3374-4DED-84FC-26C90E8A4EC2}" type="presParOf" srcId="{3F8C558A-3025-4E30-993C-E4794EF17626}" destId="{ADBB9E7D-5F04-4384-8B4E-FBBF086A7097}" srcOrd="0" destOrd="0" presId="urn:microsoft.com/office/officeart/2005/8/layout/default#1"/>
     <dgm:cxn modelId="{8C33536F-F502-4887-9371-B0002B823EAD}" type="presParOf" srcId="{3F8C558A-3025-4E30-993C-E4794EF17626}" destId="{5D4816A2-8DBA-463D-B586-F93E61C9B289}" srcOrd="1" destOrd="0" presId="urn:microsoft.com/office/officeart/2005/8/layout/default#1"/>
     <dgm:cxn modelId="{90C2B1F7-E0E6-4477-BF29-FB3A0F2CD358}" type="presParOf" srcId="{3F8C558A-3025-4E30-993C-E4794EF17626}" destId="{F8D81F5B-C592-418A-8DDB-866D4815E0C9}" srcOrd="2" destOrd="0" presId="urn:microsoft.com/office/officeart/2005/8/layout/default#1"/>
@@ -12803,11 +12803,7 @@
           <a:p>
             <a:r>
               <a:rPr lang="en-US" dirty="0" smtClean="0"/>
-              <a:t>by </a:t>
-            </a:r>
-            <a:r>
-              <a:rPr lang="en-US" dirty="0" smtClean="0"/>
-              <a:t>Eric Castro</a:t>
+              <a:t>by Eric Castro</a:t>
             </a:r>
           </a:p>
           <a:p>
@@ -13363,14 +13359,6 @@
               </a:rPr>
               <a:t>Ability to Override each function</a:t>
             </a:r>
-            <a:endParaRPr lang="en-US" sz="2400" dirty="0" smtClean="0">
-              <a:solidFill>
-                <a:schemeClr val="accent1">
-                  <a:lumMod val="60000"/>
-                  <a:lumOff val="40000"/>
-                </a:schemeClr>
-              </a:solidFill>
-            </a:endParaRPr>
           </a:p>
         </p:txBody>
       </p:sp>
@@ -13914,7 +13902,7 @@
         </p:blipFill>
         <p:spPr>
           <a:xfrm>
-            <a:off x="8102600" y="5835623"/>
+            <a:off x="8102600" y="5817288"/>
             <a:ext cx="1041400" cy="1041400"/>
           </a:xfrm>
           <a:prstGeom prst="rect">
@@ -14558,21 +14546,15 @@
                   <a:schemeClr val="accent4"/>
                 </a:solidFill>
               </a:rPr>
-              <a:t>Simple with Java’s Serialization</a:t>
-            </a:r>
-          </a:p>
-          <a:p>
-            <a:pPr marL="742950" lvl="1" indent="-285750">
-              <a:buFont typeface="Arial"/>
-              <a:buChar char="•"/>
-            </a:pPr>
+              <a:t>Not </a:t>
+            </a:r>
             <a:r>
               <a:rPr lang="en-US" dirty="0" smtClean="0">
                 <a:solidFill>
                   <a:schemeClr val="accent4"/>
                 </a:solidFill>
               </a:rPr>
-              <a:t>Not fit for sensitive information</a:t>
+              <a:t>fit for sensitive information</a:t>
             </a:r>
           </a:p>
           <a:p>
@@ -14591,7 +14573,7 @@
             <a:r>
               <a:rPr lang="en-US" dirty="0" smtClean="0">
                 <a:solidFill>
-                  <a:schemeClr val="accent4"/>
+                  <a:schemeClr val="accent6"/>
                 </a:solidFill>
               </a:rPr>
               <a:t>Internal Storage</a:t>
@@ -14605,10 +14587,18 @@
             <a:r>
               <a:rPr lang="en-US" dirty="0" smtClean="0">
                 <a:solidFill>
-                  <a:schemeClr val="accent4"/>
+                  <a:schemeClr val="accent6"/>
                 </a:solidFill>
               </a:rPr>
-              <a:t>Device memory</a:t>
+              <a:t>Device </a:t>
+            </a:r>
+            <a:r>
+              <a:rPr lang="en-US" dirty="0" smtClean="0">
+                <a:solidFill>
+                  <a:schemeClr val="accent6"/>
+                </a:solidFill>
+              </a:rPr>
+              <a:t>memory</a:t>
             </a:r>
           </a:p>
           <a:p>
@@ -14619,7 +14609,42 @@
             <a:r>
               <a:rPr lang="en-US" dirty="0" smtClean="0">
                 <a:solidFill>
-                  <a:schemeClr val="accent4"/>
+                  <a:schemeClr val="accent6"/>
+                </a:solidFill>
+              </a:rPr>
+              <a:t>Can be simple </a:t>
+            </a:r>
+            <a:r>
+              <a:rPr lang="en-US" dirty="0">
+                <a:solidFill>
+                  <a:schemeClr val="accent6"/>
+                </a:solidFill>
+              </a:rPr>
+              <a:t>with Java’s </a:t>
+            </a:r>
+            <a:r>
+              <a:rPr lang="en-US" dirty="0" smtClean="0">
+                <a:solidFill>
+                  <a:schemeClr val="accent6"/>
+                </a:solidFill>
+              </a:rPr>
+              <a:t>Serialization</a:t>
+            </a:r>
+            <a:endParaRPr lang="en-US" dirty="0" smtClean="0">
+              <a:solidFill>
+                <a:schemeClr val="accent6"/>
+              </a:solidFill>
+            </a:endParaRPr>
+          </a:p>
+          <a:p>
+            <a:pPr marL="742950" lvl="1" indent="-285750">
+              <a:buFont typeface="Arial"/>
+              <a:buChar char="•"/>
+            </a:pPr>
+            <a:r>
+              <a:rPr lang="en-US" dirty="0" smtClean="0">
+                <a:solidFill>
+                  <a:schemeClr val="accent6"/>
                 </a:solidFill>
               </a:rPr>
               <a:t>Good for things like game saves</a:t>
@@ -14816,7 +14841,7 @@
         </p:blipFill>
         <p:spPr>
           <a:xfrm>
-            <a:off x="8067662" y="5837480"/>
+            <a:off x="8115997" y="5816600"/>
             <a:ext cx="1041400" cy="1041400"/>
           </a:xfrm>
           <a:prstGeom prst="rect">
@@ -14836,7 +14861,7 @@
         </p:nvSpPr>
         <p:spPr>
           <a:xfrm>
-            <a:off x="2362200" y="990600"/>
+            <a:off x="2438400" y="990600"/>
             <a:ext cx="4191000" cy="685800"/>
           </a:xfrm>
         </p:spPr>
@@ -14878,6 +14903,43 @@
           </a:prstGeom>
         </p:spPr>
       </p:pic>
+      <p:sp>
+        <p:nvSpPr>
+          <p:cNvPr id="3" name="TextBox 2"/>
+          <p:cNvSpPr txBox="1"/>
+          <p:nvPr/>
+        </p:nvSpPr>
+        <p:spPr>
+          <a:xfrm>
+            <a:off x="2286000" y="6324600"/>
+            <a:ext cx="4800600" cy="307777"/>
+          </a:xfrm>
+          <a:prstGeom prst="rect">
+            <a:avLst/>
+          </a:prstGeom>
+          <a:noFill/>
+        </p:spPr>
+        <p:txBody>
+          <a:bodyPr wrap="square" rtlCol="0">
+            <a:spAutoFit/>
+          </a:bodyPr>
+          <a:lstStyle/>
+          <a:p>
+            <a:r>
+              <a:rPr lang="en-US" sz="1400" dirty="0"/>
+              <a:t>https://</a:t>
+            </a:r>
+            <a:r>
+              <a:rPr lang="en-US" sz="1400" dirty="0" err="1"/>
+              <a:t>github.com</a:t>
+            </a:r>
+            <a:r>
+              <a:rPr lang="en-US" sz="1400" dirty="0"/>
+              <a:t>/ericcastro92/Temp-Converter-Example</a:t>
+            </a:r>
+          </a:p>
+        </p:txBody>
+      </p:sp>
     </p:spTree>
     <p:extLst>
       <p:ext uri="{BB962C8B-B14F-4D97-AF65-F5344CB8AC3E}">

</xml_diff>